<commit_message>
Edit diagrams and captions
</commit_message>
<xml_diff>
--- a/docs/diagrams/UndoRedoExecuteUndoStackDiagram.pptx
+++ b/docs/diagrams/UndoRedoExecuteUndoStackDiagram.pptx
@@ -112,10 +112,6 @@
 </p:presentation>
 </file>
 
-<file path=ppt/revisionInfo.xml><?xml version="1.0" encoding="utf-8"?>
-<p1510:revInfo xmlns:a="http://schemas.openxmlformats.org/drawingml/2006/main" xmlns:r="http://schemas.openxmlformats.org/officeDocument/2006/relationships" xmlns:p1510="http://schemas.microsoft.com/office/powerpoint/2015/10/main"/>
-</file>
-
 <file path=ppt/slideLayouts/slideLayout1.xml><?xml version="1.0" encoding="utf-8"?>
 <p:sldLayout xmlns:a="http://schemas.openxmlformats.org/drawingml/2006/main" xmlns:r="http://schemas.openxmlformats.org/officeDocument/2006/relationships" xmlns:p="http://schemas.openxmlformats.org/presentationml/2006/main" type="title" preserve="1">
   <p:cSld name="Title Slide">
@@ -138,7 +134,7 @@
           <p:cNvPr id="2" name="Title 1">
             <a:extLst>
               <a:ext uri="{FF2B5EF4-FFF2-40B4-BE49-F238E27FC236}">
-                <a16:creationId xmlns:a16="http://schemas.microsoft.com/office/drawing/2014/main" xmlns="" id="{39FCC519-EE2E-4054-A653-93D611E0133E}"/>
+                <a16:creationId xmlns:a16="http://schemas.microsoft.com/office/drawing/2014/main" id="{39FCC519-EE2E-4054-A653-93D611E0133E}"/>
               </a:ext>
             </a:extLst>
           </p:cNvPr>
@@ -176,7 +172,7 @@
           <p:cNvPr id="3" name="Subtitle 2">
             <a:extLst>
               <a:ext uri="{FF2B5EF4-FFF2-40B4-BE49-F238E27FC236}">
-                <a16:creationId xmlns:a16="http://schemas.microsoft.com/office/drawing/2014/main" xmlns="" id="{3EDEA74E-4030-4F69-A055-4C6319EEEC29}"/>
+                <a16:creationId xmlns:a16="http://schemas.microsoft.com/office/drawing/2014/main" id="{3EDEA74E-4030-4F69-A055-4C6319EEEC29}"/>
               </a:ext>
             </a:extLst>
           </p:cNvPr>
@@ -247,7 +243,7 @@
           <p:cNvPr id="4" name="Date Placeholder 3">
             <a:extLst>
               <a:ext uri="{FF2B5EF4-FFF2-40B4-BE49-F238E27FC236}">
-                <a16:creationId xmlns:a16="http://schemas.microsoft.com/office/drawing/2014/main" xmlns="" id="{E5CC99E3-37A6-4485-B9A2-AF27A72608C6}"/>
+                <a16:creationId xmlns:a16="http://schemas.microsoft.com/office/drawing/2014/main" id="{E5CC99E3-37A6-4485-B9A2-AF27A72608C6}"/>
               </a:ext>
             </a:extLst>
           </p:cNvPr>
@@ -265,7 +261,7 @@
           <a:p>
             <a:fld id="{03EC4E3E-8101-482F-A883-8B55DAFF7C07}" type="datetimeFigureOut">
               <a:rPr lang="en-SG" smtClean="0"/>
-              <a:t>30/12/2017</a:t>
+              <a:t>17/3/2018</a:t>
             </a:fld>
             <a:endParaRPr lang="en-SG"/>
           </a:p>
@@ -276,7 +272,7 @@
           <p:cNvPr id="5" name="Footer Placeholder 4">
             <a:extLst>
               <a:ext uri="{FF2B5EF4-FFF2-40B4-BE49-F238E27FC236}">
-                <a16:creationId xmlns:a16="http://schemas.microsoft.com/office/drawing/2014/main" xmlns="" id="{D75BD546-D949-4A25-8EA4-47DF23229409}"/>
+                <a16:creationId xmlns:a16="http://schemas.microsoft.com/office/drawing/2014/main" id="{D75BD546-D949-4A25-8EA4-47DF23229409}"/>
               </a:ext>
             </a:extLst>
           </p:cNvPr>
@@ -301,7 +297,7 @@
           <p:cNvPr id="6" name="Slide Number Placeholder 5">
             <a:extLst>
               <a:ext uri="{FF2B5EF4-FFF2-40B4-BE49-F238E27FC236}">
-                <a16:creationId xmlns:a16="http://schemas.microsoft.com/office/drawing/2014/main" xmlns="" id="{68147391-4DF6-4ACF-BCE9-C1A9DAC803E3}"/>
+                <a16:creationId xmlns:a16="http://schemas.microsoft.com/office/drawing/2014/main" id="{68147391-4DF6-4ACF-BCE9-C1A9DAC803E3}"/>
               </a:ext>
             </a:extLst>
           </p:cNvPr>
@@ -360,7 +356,7 @@
           <p:cNvPr id="2" name="Title 1">
             <a:extLst>
               <a:ext uri="{FF2B5EF4-FFF2-40B4-BE49-F238E27FC236}">
-                <a16:creationId xmlns:a16="http://schemas.microsoft.com/office/drawing/2014/main" xmlns="" id="{251D3DFE-0C62-45F5-B1BF-FD1F194ED112}"/>
+                <a16:creationId xmlns:a16="http://schemas.microsoft.com/office/drawing/2014/main" id="{251D3DFE-0C62-45F5-B1BF-FD1F194ED112}"/>
               </a:ext>
             </a:extLst>
           </p:cNvPr>
@@ -389,7 +385,7 @@
           <p:cNvPr id="3" name="Vertical Text Placeholder 2">
             <a:extLst>
               <a:ext uri="{FF2B5EF4-FFF2-40B4-BE49-F238E27FC236}">
-                <a16:creationId xmlns:a16="http://schemas.microsoft.com/office/drawing/2014/main" xmlns="" id="{D2392762-3586-4B6D-A174-2D3ACF0A125B}"/>
+                <a16:creationId xmlns:a16="http://schemas.microsoft.com/office/drawing/2014/main" id="{D2392762-3586-4B6D-A174-2D3ACF0A125B}"/>
               </a:ext>
             </a:extLst>
           </p:cNvPr>
@@ -447,7 +443,7 @@
           <p:cNvPr id="4" name="Date Placeholder 3">
             <a:extLst>
               <a:ext uri="{FF2B5EF4-FFF2-40B4-BE49-F238E27FC236}">
-                <a16:creationId xmlns:a16="http://schemas.microsoft.com/office/drawing/2014/main" xmlns="" id="{73B232E7-84FB-4535-9FC1-1BEF8F17421F}"/>
+                <a16:creationId xmlns:a16="http://schemas.microsoft.com/office/drawing/2014/main" id="{73B232E7-84FB-4535-9FC1-1BEF8F17421F}"/>
               </a:ext>
             </a:extLst>
           </p:cNvPr>
@@ -465,7 +461,7 @@
           <a:p>
             <a:fld id="{03EC4E3E-8101-482F-A883-8B55DAFF7C07}" type="datetimeFigureOut">
               <a:rPr lang="en-SG" smtClean="0"/>
-              <a:t>30/12/2017</a:t>
+              <a:t>17/3/2018</a:t>
             </a:fld>
             <a:endParaRPr lang="en-SG"/>
           </a:p>
@@ -476,7 +472,7 @@
           <p:cNvPr id="5" name="Footer Placeholder 4">
             <a:extLst>
               <a:ext uri="{FF2B5EF4-FFF2-40B4-BE49-F238E27FC236}">
-                <a16:creationId xmlns:a16="http://schemas.microsoft.com/office/drawing/2014/main" xmlns="" id="{76F796EF-04EF-401A-AC84-F7BDBC99DE80}"/>
+                <a16:creationId xmlns:a16="http://schemas.microsoft.com/office/drawing/2014/main" id="{76F796EF-04EF-401A-AC84-F7BDBC99DE80}"/>
               </a:ext>
             </a:extLst>
           </p:cNvPr>
@@ -501,7 +497,7 @@
           <p:cNvPr id="6" name="Slide Number Placeholder 5">
             <a:extLst>
               <a:ext uri="{FF2B5EF4-FFF2-40B4-BE49-F238E27FC236}">
-                <a16:creationId xmlns:a16="http://schemas.microsoft.com/office/drawing/2014/main" xmlns="" id="{8F55F009-0A64-4649-A732-4AA6D619F1F3}"/>
+                <a16:creationId xmlns:a16="http://schemas.microsoft.com/office/drawing/2014/main" id="{8F55F009-0A64-4649-A732-4AA6D619F1F3}"/>
               </a:ext>
             </a:extLst>
           </p:cNvPr>
@@ -560,7 +556,7 @@
           <p:cNvPr id="2" name="Vertical Title 1">
             <a:extLst>
               <a:ext uri="{FF2B5EF4-FFF2-40B4-BE49-F238E27FC236}">
-                <a16:creationId xmlns:a16="http://schemas.microsoft.com/office/drawing/2014/main" xmlns="" id="{F7DE9595-D7A8-4E19-B4C6-E295F978F6A4}"/>
+                <a16:creationId xmlns:a16="http://schemas.microsoft.com/office/drawing/2014/main" id="{F7DE9595-D7A8-4E19-B4C6-E295F978F6A4}"/>
               </a:ext>
             </a:extLst>
           </p:cNvPr>
@@ -594,7 +590,7 @@
           <p:cNvPr id="3" name="Vertical Text Placeholder 2">
             <a:extLst>
               <a:ext uri="{FF2B5EF4-FFF2-40B4-BE49-F238E27FC236}">
-                <a16:creationId xmlns:a16="http://schemas.microsoft.com/office/drawing/2014/main" xmlns="" id="{0D2975B7-7A6D-40EA-B2F6-338022AD2BF1}"/>
+                <a16:creationId xmlns:a16="http://schemas.microsoft.com/office/drawing/2014/main" id="{0D2975B7-7A6D-40EA-B2F6-338022AD2BF1}"/>
               </a:ext>
             </a:extLst>
           </p:cNvPr>
@@ -657,7 +653,7 @@
           <p:cNvPr id="4" name="Date Placeholder 3">
             <a:extLst>
               <a:ext uri="{FF2B5EF4-FFF2-40B4-BE49-F238E27FC236}">
-                <a16:creationId xmlns:a16="http://schemas.microsoft.com/office/drawing/2014/main" xmlns="" id="{C8230AC3-1BED-4D2B-96D3-51C50E14A9E6}"/>
+                <a16:creationId xmlns:a16="http://schemas.microsoft.com/office/drawing/2014/main" id="{C8230AC3-1BED-4D2B-96D3-51C50E14A9E6}"/>
               </a:ext>
             </a:extLst>
           </p:cNvPr>
@@ -675,7 +671,7 @@
           <a:p>
             <a:fld id="{03EC4E3E-8101-482F-A883-8B55DAFF7C07}" type="datetimeFigureOut">
               <a:rPr lang="en-SG" smtClean="0"/>
-              <a:t>30/12/2017</a:t>
+              <a:t>17/3/2018</a:t>
             </a:fld>
             <a:endParaRPr lang="en-SG"/>
           </a:p>
@@ -686,7 +682,7 @@
           <p:cNvPr id="5" name="Footer Placeholder 4">
             <a:extLst>
               <a:ext uri="{FF2B5EF4-FFF2-40B4-BE49-F238E27FC236}">
-                <a16:creationId xmlns:a16="http://schemas.microsoft.com/office/drawing/2014/main" xmlns="" id="{4AD6CA96-231A-43AD-B530-7C509651DE3B}"/>
+                <a16:creationId xmlns:a16="http://schemas.microsoft.com/office/drawing/2014/main" id="{4AD6CA96-231A-43AD-B530-7C509651DE3B}"/>
               </a:ext>
             </a:extLst>
           </p:cNvPr>
@@ -711,7 +707,7 @@
           <p:cNvPr id="6" name="Slide Number Placeholder 5">
             <a:extLst>
               <a:ext uri="{FF2B5EF4-FFF2-40B4-BE49-F238E27FC236}">
-                <a16:creationId xmlns:a16="http://schemas.microsoft.com/office/drawing/2014/main" xmlns="" id="{12063E3B-180A-454E-A661-6CCD48D7062C}"/>
+                <a16:creationId xmlns:a16="http://schemas.microsoft.com/office/drawing/2014/main" id="{12063E3B-180A-454E-A661-6CCD48D7062C}"/>
               </a:ext>
             </a:extLst>
           </p:cNvPr>
@@ -770,7 +766,7 @@
           <p:cNvPr id="2" name="Title 1">
             <a:extLst>
               <a:ext uri="{FF2B5EF4-FFF2-40B4-BE49-F238E27FC236}">
-                <a16:creationId xmlns:a16="http://schemas.microsoft.com/office/drawing/2014/main" xmlns="" id="{7E861C8D-BAF0-4DD9-92B9-591B272791CA}"/>
+                <a16:creationId xmlns:a16="http://schemas.microsoft.com/office/drawing/2014/main" id="{7E861C8D-BAF0-4DD9-92B9-591B272791CA}"/>
               </a:ext>
             </a:extLst>
           </p:cNvPr>
@@ -799,7 +795,7 @@
           <p:cNvPr id="3" name="Content Placeholder 2">
             <a:extLst>
               <a:ext uri="{FF2B5EF4-FFF2-40B4-BE49-F238E27FC236}">
-                <a16:creationId xmlns:a16="http://schemas.microsoft.com/office/drawing/2014/main" xmlns="" id="{534DA4BD-1D78-446B-B79F-C1229642DDEB}"/>
+                <a16:creationId xmlns:a16="http://schemas.microsoft.com/office/drawing/2014/main" id="{534DA4BD-1D78-446B-B79F-C1229642DDEB}"/>
               </a:ext>
             </a:extLst>
           </p:cNvPr>
@@ -857,7 +853,7 @@
           <p:cNvPr id="4" name="Date Placeholder 3">
             <a:extLst>
               <a:ext uri="{FF2B5EF4-FFF2-40B4-BE49-F238E27FC236}">
-                <a16:creationId xmlns:a16="http://schemas.microsoft.com/office/drawing/2014/main" xmlns="" id="{AD6BEDB5-7B62-4953-BECB-7F7F3E909CAC}"/>
+                <a16:creationId xmlns:a16="http://schemas.microsoft.com/office/drawing/2014/main" id="{AD6BEDB5-7B62-4953-BECB-7F7F3E909CAC}"/>
               </a:ext>
             </a:extLst>
           </p:cNvPr>
@@ -875,7 +871,7 @@
           <a:p>
             <a:fld id="{03EC4E3E-8101-482F-A883-8B55DAFF7C07}" type="datetimeFigureOut">
               <a:rPr lang="en-SG" smtClean="0"/>
-              <a:t>30/12/2017</a:t>
+              <a:t>17/3/2018</a:t>
             </a:fld>
             <a:endParaRPr lang="en-SG"/>
           </a:p>
@@ -886,7 +882,7 @@
           <p:cNvPr id="5" name="Footer Placeholder 4">
             <a:extLst>
               <a:ext uri="{FF2B5EF4-FFF2-40B4-BE49-F238E27FC236}">
-                <a16:creationId xmlns:a16="http://schemas.microsoft.com/office/drawing/2014/main" xmlns="" id="{349CD732-2DD1-42BE-8480-5C6507018294}"/>
+                <a16:creationId xmlns:a16="http://schemas.microsoft.com/office/drawing/2014/main" id="{349CD732-2DD1-42BE-8480-5C6507018294}"/>
               </a:ext>
             </a:extLst>
           </p:cNvPr>
@@ -911,7 +907,7 @@
           <p:cNvPr id="6" name="Slide Number Placeholder 5">
             <a:extLst>
               <a:ext uri="{FF2B5EF4-FFF2-40B4-BE49-F238E27FC236}">
-                <a16:creationId xmlns:a16="http://schemas.microsoft.com/office/drawing/2014/main" xmlns="" id="{574C27E0-F36A-4438-9402-C2CB0377D92D}"/>
+                <a16:creationId xmlns:a16="http://schemas.microsoft.com/office/drawing/2014/main" id="{574C27E0-F36A-4438-9402-C2CB0377D92D}"/>
               </a:ext>
             </a:extLst>
           </p:cNvPr>
@@ -970,7 +966,7 @@
           <p:cNvPr id="2" name="Title 1">
             <a:extLst>
               <a:ext uri="{FF2B5EF4-FFF2-40B4-BE49-F238E27FC236}">
-                <a16:creationId xmlns:a16="http://schemas.microsoft.com/office/drawing/2014/main" xmlns="" id="{80A42FFA-8A45-40F8-9C5C-9906971B38AB}"/>
+                <a16:creationId xmlns:a16="http://schemas.microsoft.com/office/drawing/2014/main" id="{80A42FFA-8A45-40F8-9C5C-9906971B38AB}"/>
               </a:ext>
             </a:extLst>
           </p:cNvPr>
@@ -1008,7 +1004,7 @@
           <p:cNvPr id="3" name="Text Placeholder 2">
             <a:extLst>
               <a:ext uri="{FF2B5EF4-FFF2-40B4-BE49-F238E27FC236}">
-                <a16:creationId xmlns:a16="http://schemas.microsoft.com/office/drawing/2014/main" xmlns="" id="{7D8879A7-8225-4473-B738-B780B6224EC5}"/>
+                <a16:creationId xmlns:a16="http://schemas.microsoft.com/office/drawing/2014/main" id="{7D8879A7-8225-4473-B738-B780B6224EC5}"/>
               </a:ext>
             </a:extLst>
           </p:cNvPr>
@@ -1133,7 +1129,7 @@
           <p:cNvPr id="4" name="Date Placeholder 3">
             <a:extLst>
               <a:ext uri="{FF2B5EF4-FFF2-40B4-BE49-F238E27FC236}">
-                <a16:creationId xmlns:a16="http://schemas.microsoft.com/office/drawing/2014/main" xmlns="" id="{6CF7978C-FE65-4091-9152-E33029C12AEA}"/>
+                <a16:creationId xmlns:a16="http://schemas.microsoft.com/office/drawing/2014/main" id="{6CF7978C-FE65-4091-9152-E33029C12AEA}"/>
               </a:ext>
             </a:extLst>
           </p:cNvPr>
@@ -1151,7 +1147,7 @@
           <a:p>
             <a:fld id="{03EC4E3E-8101-482F-A883-8B55DAFF7C07}" type="datetimeFigureOut">
               <a:rPr lang="en-SG" smtClean="0"/>
-              <a:t>30/12/2017</a:t>
+              <a:t>17/3/2018</a:t>
             </a:fld>
             <a:endParaRPr lang="en-SG"/>
           </a:p>
@@ -1162,7 +1158,7 @@
           <p:cNvPr id="5" name="Footer Placeholder 4">
             <a:extLst>
               <a:ext uri="{FF2B5EF4-FFF2-40B4-BE49-F238E27FC236}">
-                <a16:creationId xmlns:a16="http://schemas.microsoft.com/office/drawing/2014/main" xmlns="" id="{B344C9CC-480F-4DCB-AC70-D7A4CCA0B8B7}"/>
+                <a16:creationId xmlns:a16="http://schemas.microsoft.com/office/drawing/2014/main" id="{B344C9CC-480F-4DCB-AC70-D7A4CCA0B8B7}"/>
               </a:ext>
             </a:extLst>
           </p:cNvPr>
@@ -1187,7 +1183,7 @@
           <p:cNvPr id="6" name="Slide Number Placeholder 5">
             <a:extLst>
               <a:ext uri="{FF2B5EF4-FFF2-40B4-BE49-F238E27FC236}">
-                <a16:creationId xmlns:a16="http://schemas.microsoft.com/office/drawing/2014/main" xmlns="" id="{8F5A07EC-843A-4ED9-8F1C-AD703CA36D58}"/>
+                <a16:creationId xmlns:a16="http://schemas.microsoft.com/office/drawing/2014/main" id="{8F5A07EC-843A-4ED9-8F1C-AD703CA36D58}"/>
               </a:ext>
             </a:extLst>
           </p:cNvPr>
@@ -1246,7 +1242,7 @@
           <p:cNvPr id="2" name="Title 1">
             <a:extLst>
               <a:ext uri="{FF2B5EF4-FFF2-40B4-BE49-F238E27FC236}">
-                <a16:creationId xmlns:a16="http://schemas.microsoft.com/office/drawing/2014/main" xmlns="" id="{056EE2DA-07D9-4774-A8CA-0CA247F8C72A}"/>
+                <a16:creationId xmlns:a16="http://schemas.microsoft.com/office/drawing/2014/main" id="{056EE2DA-07D9-4774-A8CA-0CA247F8C72A}"/>
               </a:ext>
             </a:extLst>
           </p:cNvPr>
@@ -1275,7 +1271,7 @@
           <p:cNvPr id="3" name="Content Placeholder 2">
             <a:extLst>
               <a:ext uri="{FF2B5EF4-FFF2-40B4-BE49-F238E27FC236}">
-                <a16:creationId xmlns:a16="http://schemas.microsoft.com/office/drawing/2014/main" xmlns="" id="{3CF93A59-4E25-4FFA-8796-AA06EF3E5C3E}"/>
+                <a16:creationId xmlns:a16="http://schemas.microsoft.com/office/drawing/2014/main" id="{3CF93A59-4E25-4FFA-8796-AA06EF3E5C3E}"/>
               </a:ext>
             </a:extLst>
           </p:cNvPr>
@@ -1338,7 +1334,7 @@
           <p:cNvPr id="4" name="Content Placeholder 3">
             <a:extLst>
               <a:ext uri="{FF2B5EF4-FFF2-40B4-BE49-F238E27FC236}">
-                <a16:creationId xmlns:a16="http://schemas.microsoft.com/office/drawing/2014/main" xmlns="" id="{81373B10-E346-4893-AFEE-65E014405E2D}"/>
+                <a16:creationId xmlns:a16="http://schemas.microsoft.com/office/drawing/2014/main" id="{81373B10-E346-4893-AFEE-65E014405E2D}"/>
               </a:ext>
             </a:extLst>
           </p:cNvPr>
@@ -1401,7 +1397,7 @@
           <p:cNvPr id="5" name="Date Placeholder 4">
             <a:extLst>
               <a:ext uri="{FF2B5EF4-FFF2-40B4-BE49-F238E27FC236}">
-                <a16:creationId xmlns:a16="http://schemas.microsoft.com/office/drawing/2014/main" xmlns="" id="{D9C411A1-6D64-4C63-A758-5D2FEE677F45}"/>
+                <a16:creationId xmlns:a16="http://schemas.microsoft.com/office/drawing/2014/main" id="{D9C411A1-6D64-4C63-A758-5D2FEE677F45}"/>
               </a:ext>
             </a:extLst>
           </p:cNvPr>
@@ -1419,7 +1415,7 @@
           <a:p>
             <a:fld id="{03EC4E3E-8101-482F-A883-8B55DAFF7C07}" type="datetimeFigureOut">
               <a:rPr lang="en-SG" smtClean="0"/>
-              <a:t>30/12/2017</a:t>
+              <a:t>17/3/2018</a:t>
             </a:fld>
             <a:endParaRPr lang="en-SG"/>
           </a:p>
@@ -1430,7 +1426,7 @@
           <p:cNvPr id="6" name="Footer Placeholder 5">
             <a:extLst>
               <a:ext uri="{FF2B5EF4-FFF2-40B4-BE49-F238E27FC236}">
-                <a16:creationId xmlns:a16="http://schemas.microsoft.com/office/drawing/2014/main" xmlns="" id="{8D9C2E46-644C-4155-A697-764A7A0AB1F4}"/>
+                <a16:creationId xmlns:a16="http://schemas.microsoft.com/office/drawing/2014/main" id="{8D9C2E46-644C-4155-A697-764A7A0AB1F4}"/>
               </a:ext>
             </a:extLst>
           </p:cNvPr>
@@ -1455,7 +1451,7 @@
           <p:cNvPr id="7" name="Slide Number Placeholder 6">
             <a:extLst>
               <a:ext uri="{FF2B5EF4-FFF2-40B4-BE49-F238E27FC236}">
-                <a16:creationId xmlns:a16="http://schemas.microsoft.com/office/drawing/2014/main" xmlns="" id="{6192DEDD-6479-45E4-B1F5-6EDD41BBB103}"/>
+                <a16:creationId xmlns:a16="http://schemas.microsoft.com/office/drawing/2014/main" id="{6192DEDD-6479-45E4-B1F5-6EDD41BBB103}"/>
               </a:ext>
             </a:extLst>
           </p:cNvPr>
@@ -1514,7 +1510,7 @@
           <p:cNvPr id="2" name="Title 1">
             <a:extLst>
               <a:ext uri="{FF2B5EF4-FFF2-40B4-BE49-F238E27FC236}">
-                <a16:creationId xmlns:a16="http://schemas.microsoft.com/office/drawing/2014/main" xmlns="" id="{DC0ED888-63EF-4CC0-8500-9C8DB672FEC2}"/>
+                <a16:creationId xmlns:a16="http://schemas.microsoft.com/office/drawing/2014/main" id="{DC0ED888-63EF-4CC0-8500-9C8DB672FEC2}"/>
               </a:ext>
             </a:extLst>
           </p:cNvPr>
@@ -1548,7 +1544,7 @@
           <p:cNvPr id="3" name="Text Placeholder 2">
             <a:extLst>
               <a:ext uri="{FF2B5EF4-FFF2-40B4-BE49-F238E27FC236}">
-                <a16:creationId xmlns:a16="http://schemas.microsoft.com/office/drawing/2014/main" xmlns="" id="{3C33BC1E-FB79-4906-A967-9C7046C6D272}"/>
+                <a16:creationId xmlns:a16="http://schemas.microsoft.com/office/drawing/2014/main" id="{3C33BC1E-FB79-4906-A967-9C7046C6D272}"/>
               </a:ext>
             </a:extLst>
           </p:cNvPr>
@@ -1619,7 +1615,7 @@
           <p:cNvPr id="4" name="Content Placeholder 3">
             <a:extLst>
               <a:ext uri="{FF2B5EF4-FFF2-40B4-BE49-F238E27FC236}">
-                <a16:creationId xmlns:a16="http://schemas.microsoft.com/office/drawing/2014/main" xmlns="" id="{697A4EC6-1C42-4BA4-8108-32579276C17B}"/>
+                <a16:creationId xmlns:a16="http://schemas.microsoft.com/office/drawing/2014/main" id="{697A4EC6-1C42-4BA4-8108-32579276C17B}"/>
               </a:ext>
             </a:extLst>
           </p:cNvPr>
@@ -1682,7 +1678,7 @@
           <p:cNvPr id="5" name="Text Placeholder 4">
             <a:extLst>
               <a:ext uri="{FF2B5EF4-FFF2-40B4-BE49-F238E27FC236}">
-                <a16:creationId xmlns:a16="http://schemas.microsoft.com/office/drawing/2014/main" xmlns="" id="{8A2CA209-B9F5-4E1E-B302-74CC2D4CFDFB}"/>
+                <a16:creationId xmlns:a16="http://schemas.microsoft.com/office/drawing/2014/main" id="{8A2CA209-B9F5-4E1E-B302-74CC2D4CFDFB}"/>
               </a:ext>
             </a:extLst>
           </p:cNvPr>
@@ -1753,7 +1749,7 @@
           <p:cNvPr id="6" name="Content Placeholder 5">
             <a:extLst>
               <a:ext uri="{FF2B5EF4-FFF2-40B4-BE49-F238E27FC236}">
-                <a16:creationId xmlns:a16="http://schemas.microsoft.com/office/drawing/2014/main" xmlns="" id="{0E6E876D-DC4D-40EE-BA38-CD01089602CF}"/>
+                <a16:creationId xmlns:a16="http://schemas.microsoft.com/office/drawing/2014/main" id="{0E6E876D-DC4D-40EE-BA38-CD01089602CF}"/>
               </a:ext>
             </a:extLst>
           </p:cNvPr>
@@ -1816,7 +1812,7 @@
           <p:cNvPr id="7" name="Date Placeholder 6">
             <a:extLst>
               <a:ext uri="{FF2B5EF4-FFF2-40B4-BE49-F238E27FC236}">
-                <a16:creationId xmlns:a16="http://schemas.microsoft.com/office/drawing/2014/main" xmlns="" id="{F24E1D97-8B3C-41A1-B0BA-BA833AD8BC7C}"/>
+                <a16:creationId xmlns:a16="http://schemas.microsoft.com/office/drawing/2014/main" id="{F24E1D97-8B3C-41A1-B0BA-BA833AD8BC7C}"/>
               </a:ext>
             </a:extLst>
           </p:cNvPr>
@@ -1834,7 +1830,7 @@
           <a:p>
             <a:fld id="{03EC4E3E-8101-482F-A883-8B55DAFF7C07}" type="datetimeFigureOut">
               <a:rPr lang="en-SG" smtClean="0"/>
-              <a:t>30/12/2017</a:t>
+              <a:t>17/3/2018</a:t>
             </a:fld>
             <a:endParaRPr lang="en-SG"/>
           </a:p>
@@ -1845,7 +1841,7 @@
           <p:cNvPr id="8" name="Footer Placeholder 7">
             <a:extLst>
               <a:ext uri="{FF2B5EF4-FFF2-40B4-BE49-F238E27FC236}">
-                <a16:creationId xmlns:a16="http://schemas.microsoft.com/office/drawing/2014/main" xmlns="" id="{FC358D8F-B7DA-4DCE-AC8F-706450EEC0DC}"/>
+                <a16:creationId xmlns:a16="http://schemas.microsoft.com/office/drawing/2014/main" id="{FC358D8F-B7DA-4DCE-AC8F-706450EEC0DC}"/>
               </a:ext>
             </a:extLst>
           </p:cNvPr>
@@ -1870,7 +1866,7 @@
           <p:cNvPr id="9" name="Slide Number Placeholder 8">
             <a:extLst>
               <a:ext uri="{FF2B5EF4-FFF2-40B4-BE49-F238E27FC236}">
-                <a16:creationId xmlns:a16="http://schemas.microsoft.com/office/drawing/2014/main" xmlns="" id="{40CE354E-2C73-4B6F-8AEB-14D1378A77E1}"/>
+                <a16:creationId xmlns:a16="http://schemas.microsoft.com/office/drawing/2014/main" id="{40CE354E-2C73-4B6F-8AEB-14D1378A77E1}"/>
               </a:ext>
             </a:extLst>
           </p:cNvPr>
@@ -1929,7 +1925,7 @@
           <p:cNvPr id="2" name="Title 1">
             <a:extLst>
               <a:ext uri="{FF2B5EF4-FFF2-40B4-BE49-F238E27FC236}">
-                <a16:creationId xmlns:a16="http://schemas.microsoft.com/office/drawing/2014/main" xmlns="" id="{17D9D381-288C-43FB-86C2-AAA4FCFD43FD}"/>
+                <a16:creationId xmlns:a16="http://schemas.microsoft.com/office/drawing/2014/main" id="{17D9D381-288C-43FB-86C2-AAA4FCFD43FD}"/>
               </a:ext>
             </a:extLst>
           </p:cNvPr>
@@ -1958,7 +1954,7 @@
           <p:cNvPr id="3" name="Date Placeholder 2">
             <a:extLst>
               <a:ext uri="{FF2B5EF4-FFF2-40B4-BE49-F238E27FC236}">
-                <a16:creationId xmlns:a16="http://schemas.microsoft.com/office/drawing/2014/main" xmlns="" id="{A85D75E5-4830-4F75-8132-91122609F925}"/>
+                <a16:creationId xmlns:a16="http://schemas.microsoft.com/office/drawing/2014/main" id="{A85D75E5-4830-4F75-8132-91122609F925}"/>
               </a:ext>
             </a:extLst>
           </p:cNvPr>
@@ -1976,7 +1972,7 @@
           <a:p>
             <a:fld id="{03EC4E3E-8101-482F-A883-8B55DAFF7C07}" type="datetimeFigureOut">
               <a:rPr lang="en-SG" smtClean="0"/>
-              <a:t>30/12/2017</a:t>
+              <a:t>17/3/2018</a:t>
             </a:fld>
             <a:endParaRPr lang="en-SG"/>
           </a:p>
@@ -1987,7 +1983,7 @@
           <p:cNvPr id="4" name="Footer Placeholder 3">
             <a:extLst>
               <a:ext uri="{FF2B5EF4-FFF2-40B4-BE49-F238E27FC236}">
-                <a16:creationId xmlns:a16="http://schemas.microsoft.com/office/drawing/2014/main" xmlns="" id="{0C14A42C-834F-43EA-8053-84D5A665CEE7}"/>
+                <a16:creationId xmlns:a16="http://schemas.microsoft.com/office/drawing/2014/main" id="{0C14A42C-834F-43EA-8053-84D5A665CEE7}"/>
               </a:ext>
             </a:extLst>
           </p:cNvPr>
@@ -2012,7 +2008,7 @@
           <p:cNvPr id="5" name="Slide Number Placeholder 4">
             <a:extLst>
               <a:ext uri="{FF2B5EF4-FFF2-40B4-BE49-F238E27FC236}">
-                <a16:creationId xmlns:a16="http://schemas.microsoft.com/office/drawing/2014/main" xmlns="" id="{38C1E789-CDA9-48FF-A7BA-F21E31600226}"/>
+                <a16:creationId xmlns:a16="http://schemas.microsoft.com/office/drawing/2014/main" id="{38C1E789-CDA9-48FF-A7BA-F21E31600226}"/>
               </a:ext>
             </a:extLst>
           </p:cNvPr>
@@ -2071,7 +2067,7 @@
           <p:cNvPr id="2" name="Date Placeholder 1">
             <a:extLst>
               <a:ext uri="{FF2B5EF4-FFF2-40B4-BE49-F238E27FC236}">
-                <a16:creationId xmlns:a16="http://schemas.microsoft.com/office/drawing/2014/main" xmlns="" id="{21A40ECD-0ABD-4F35-B481-512A01FC643D}"/>
+                <a16:creationId xmlns:a16="http://schemas.microsoft.com/office/drawing/2014/main" id="{21A40ECD-0ABD-4F35-B481-512A01FC643D}"/>
               </a:ext>
             </a:extLst>
           </p:cNvPr>
@@ -2089,7 +2085,7 @@
           <a:p>
             <a:fld id="{03EC4E3E-8101-482F-A883-8B55DAFF7C07}" type="datetimeFigureOut">
               <a:rPr lang="en-SG" smtClean="0"/>
-              <a:t>30/12/2017</a:t>
+              <a:t>17/3/2018</a:t>
             </a:fld>
             <a:endParaRPr lang="en-SG"/>
           </a:p>
@@ -2100,7 +2096,7 @@
           <p:cNvPr id="3" name="Footer Placeholder 2">
             <a:extLst>
               <a:ext uri="{FF2B5EF4-FFF2-40B4-BE49-F238E27FC236}">
-                <a16:creationId xmlns:a16="http://schemas.microsoft.com/office/drawing/2014/main" xmlns="" id="{D44B8F11-A412-4FA6-9070-B9C742F699F3}"/>
+                <a16:creationId xmlns:a16="http://schemas.microsoft.com/office/drawing/2014/main" id="{D44B8F11-A412-4FA6-9070-B9C742F699F3}"/>
               </a:ext>
             </a:extLst>
           </p:cNvPr>
@@ -2125,7 +2121,7 @@
           <p:cNvPr id="4" name="Slide Number Placeholder 3">
             <a:extLst>
               <a:ext uri="{FF2B5EF4-FFF2-40B4-BE49-F238E27FC236}">
-                <a16:creationId xmlns:a16="http://schemas.microsoft.com/office/drawing/2014/main" xmlns="" id="{E3EA086A-DA0B-4378-A128-F213644ECB0C}"/>
+                <a16:creationId xmlns:a16="http://schemas.microsoft.com/office/drawing/2014/main" id="{E3EA086A-DA0B-4378-A128-F213644ECB0C}"/>
               </a:ext>
             </a:extLst>
           </p:cNvPr>
@@ -2184,7 +2180,7 @@
           <p:cNvPr id="2" name="Title 1">
             <a:extLst>
               <a:ext uri="{FF2B5EF4-FFF2-40B4-BE49-F238E27FC236}">
-                <a16:creationId xmlns:a16="http://schemas.microsoft.com/office/drawing/2014/main" xmlns="" id="{765D165A-D423-4E89-A075-D59A9FB59792}"/>
+                <a16:creationId xmlns:a16="http://schemas.microsoft.com/office/drawing/2014/main" id="{765D165A-D423-4E89-A075-D59A9FB59792}"/>
               </a:ext>
             </a:extLst>
           </p:cNvPr>
@@ -2222,7 +2218,7 @@
           <p:cNvPr id="3" name="Content Placeholder 2">
             <a:extLst>
               <a:ext uri="{FF2B5EF4-FFF2-40B4-BE49-F238E27FC236}">
-                <a16:creationId xmlns:a16="http://schemas.microsoft.com/office/drawing/2014/main" xmlns="" id="{77C2A5CC-2876-49CA-993D-F4F73FC9D2B0}"/>
+                <a16:creationId xmlns:a16="http://schemas.microsoft.com/office/drawing/2014/main" id="{77C2A5CC-2876-49CA-993D-F4F73FC9D2B0}"/>
               </a:ext>
             </a:extLst>
           </p:cNvPr>
@@ -2313,7 +2309,7 @@
           <p:cNvPr id="4" name="Text Placeholder 3">
             <a:extLst>
               <a:ext uri="{FF2B5EF4-FFF2-40B4-BE49-F238E27FC236}">
-                <a16:creationId xmlns:a16="http://schemas.microsoft.com/office/drawing/2014/main" xmlns="" id="{7B4DE2E8-CCF6-4E88-A858-05A04CD0D736}"/>
+                <a16:creationId xmlns:a16="http://schemas.microsoft.com/office/drawing/2014/main" id="{7B4DE2E8-CCF6-4E88-A858-05A04CD0D736}"/>
               </a:ext>
             </a:extLst>
           </p:cNvPr>
@@ -2384,7 +2380,7 @@
           <p:cNvPr id="5" name="Date Placeholder 4">
             <a:extLst>
               <a:ext uri="{FF2B5EF4-FFF2-40B4-BE49-F238E27FC236}">
-                <a16:creationId xmlns:a16="http://schemas.microsoft.com/office/drawing/2014/main" xmlns="" id="{CAEBEC1E-DE48-4B55-A846-F8248E381145}"/>
+                <a16:creationId xmlns:a16="http://schemas.microsoft.com/office/drawing/2014/main" id="{CAEBEC1E-DE48-4B55-A846-F8248E381145}"/>
               </a:ext>
             </a:extLst>
           </p:cNvPr>
@@ -2402,7 +2398,7 @@
           <a:p>
             <a:fld id="{03EC4E3E-8101-482F-A883-8B55DAFF7C07}" type="datetimeFigureOut">
               <a:rPr lang="en-SG" smtClean="0"/>
-              <a:t>30/12/2017</a:t>
+              <a:t>17/3/2018</a:t>
             </a:fld>
             <a:endParaRPr lang="en-SG"/>
           </a:p>
@@ -2413,7 +2409,7 @@
           <p:cNvPr id="6" name="Footer Placeholder 5">
             <a:extLst>
               <a:ext uri="{FF2B5EF4-FFF2-40B4-BE49-F238E27FC236}">
-                <a16:creationId xmlns:a16="http://schemas.microsoft.com/office/drawing/2014/main" xmlns="" id="{945A6E8B-6BC2-49E9-B4E5-DAD3F7A1A1BF}"/>
+                <a16:creationId xmlns:a16="http://schemas.microsoft.com/office/drawing/2014/main" id="{945A6E8B-6BC2-49E9-B4E5-DAD3F7A1A1BF}"/>
               </a:ext>
             </a:extLst>
           </p:cNvPr>
@@ -2438,7 +2434,7 @@
           <p:cNvPr id="7" name="Slide Number Placeholder 6">
             <a:extLst>
               <a:ext uri="{FF2B5EF4-FFF2-40B4-BE49-F238E27FC236}">
-                <a16:creationId xmlns:a16="http://schemas.microsoft.com/office/drawing/2014/main" xmlns="" id="{E5CF739B-EDF0-43CE-A87E-C49F040C85A5}"/>
+                <a16:creationId xmlns:a16="http://schemas.microsoft.com/office/drawing/2014/main" id="{E5CF739B-EDF0-43CE-A87E-C49F040C85A5}"/>
               </a:ext>
             </a:extLst>
           </p:cNvPr>
@@ -2497,7 +2493,7 @@
           <p:cNvPr id="2" name="Title 1">
             <a:extLst>
               <a:ext uri="{FF2B5EF4-FFF2-40B4-BE49-F238E27FC236}">
-                <a16:creationId xmlns:a16="http://schemas.microsoft.com/office/drawing/2014/main" xmlns="" id="{0091F49F-E849-4834-84DB-61CF2F2652D4}"/>
+                <a16:creationId xmlns:a16="http://schemas.microsoft.com/office/drawing/2014/main" id="{0091F49F-E849-4834-84DB-61CF2F2652D4}"/>
               </a:ext>
             </a:extLst>
           </p:cNvPr>
@@ -2535,7 +2531,7 @@
           <p:cNvPr id="3" name="Picture Placeholder 2">
             <a:extLst>
               <a:ext uri="{FF2B5EF4-FFF2-40B4-BE49-F238E27FC236}">
-                <a16:creationId xmlns:a16="http://schemas.microsoft.com/office/drawing/2014/main" xmlns="" id="{631D62A9-3420-4F1C-9EB9-09EF85106E78}"/>
+                <a16:creationId xmlns:a16="http://schemas.microsoft.com/office/drawing/2014/main" id="{631D62A9-3420-4F1C-9EB9-09EF85106E78}"/>
               </a:ext>
             </a:extLst>
           </p:cNvPr>
@@ -2602,7 +2598,7 @@
           <p:cNvPr id="4" name="Text Placeholder 3">
             <a:extLst>
               <a:ext uri="{FF2B5EF4-FFF2-40B4-BE49-F238E27FC236}">
-                <a16:creationId xmlns:a16="http://schemas.microsoft.com/office/drawing/2014/main" xmlns="" id="{E450EC8D-D7F4-45FC-AD8C-2E198A32CCA2}"/>
+                <a16:creationId xmlns:a16="http://schemas.microsoft.com/office/drawing/2014/main" id="{E450EC8D-D7F4-45FC-AD8C-2E198A32CCA2}"/>
               </a:ext>
             </a:extLst>
           </p:cNvPr>
@@ -2673,7 +2669,7 @@
           <p:cNvPr id="5" name="Date Placeholder 4">
             <a:extLst>
               <a:ext uri="{FF2B5EF4-FFF2-40B4-BE49-F238E27FC236}">
-                <a16:creationId xmlns:a16="http://schemas.microsoft.com/office/drawing/2014/main" xmlns="" id="{7A73D668-ABF4-41FE-958C-542EEDC5F6CC}"/>
+                <a16:creationId xmlns:a16="http://schemas.microsoft.com/office/drawing/2014/main" id="{7A73D668-ABF4-41FE-958C-542EEDC5F6CC}"/>
               </a:ext>
             </a:extLst>
           </p:cNvPr>
@@ -2691,7 +2687,7 @@
           <a:p>
             <a:fld id="{03EC4E3E-8101-482F-A883-8B55DAFF7C07}" type="datetimeFigureOut">
               <a:rPr lang="en-SG" smtClean="0"/>
-              <a:t>30/12/2017</a:t>
+              <a:t>17/3/2018</a:t>
             </a:fld>
             <a:endParaRPr lang="en-SG"/>
           </a:p>
@@ -2702,7 +2698,7 @@
           <p:cNvPr id="6" name="Footer Placeholder 5">
             <a:extLst>
               <a:ext uri="{FF2B5EF4-FFF2-40B4-BE49-F238E27FC236}">
-                <a16:creationId xmlns:a16="http://schemas.microsoft.com/office/drawing/2014/main" xmlns="" id="{F4A83B1C-93E7-4D32-9D1B-3F37403B1ACD}"/>
+                <a16:creationId xmlns:a16="http://schemas.microsoft.com/office/drawing/2014/main" id="{F4A83B1C-93E7-4D32-9D1B-3F37403B1ACD}"/>
               </a:ext>
             </a:extLst>
           </p:cNvPr>
@@ -2727,7 +2723,7 @@
           <p:cNvPr id="7" name="Slide Number Placeholder 6">
             <a:extLst>
               <a:ext uri="{FF2B5EF4-FFF2-40B4-BE49-F238E27FC236}">
-                <a16:creationId xmlns:a16="http://schemas.microsoft.com/office/drawing/2014/main" xmlns="" id="{C6AF73BE-F17B-487B-943B-28655BB51C92}"/>
+                <a16:creationId xmlns:a16="http://schemas.microsoft.com/office/drawing/2014/main" id="{C6AF73BE-F17B-487B-943B-28655BB51C92}"/>
               </a:ext>
             </a:extLst>
           </p:cNvPr>
@@ -2791,7 +2787,7 @@
           <p:cNvPr id="2" name="Title Placeholder 1">
             <a:extLst>
               <a:ext uri="{FF2B5EF4-FFF2-40B4-BE49-F238E27FC236}">
-                <a16:creationId xmlns:a16="http://schemas.microsoft.com/office/drawing/2014/main" xmlns="" id="{96F7127E-5F47-4B37-9FDB-695AB14D9551}"/>
+                <a16:creationId xmlns:a16="http://schemas.microsoft.com/office/drawing/2014/main" id="{96F7127E-5F47-4B37-9FDB-695AB14D9551}"/>
               </a:ext>
             </a:extLst>
           </p:cNvPr>
@@ -2830,7 +2826,7 @@
           <p:cNvPr id="3" name="Text Placeholder 2">
             <a:extLst>
               <a:ext uri="{FF2B5EF4-FFF2-40B4-BE49-F238E27FC236}">
-                <a16:creationId xmlns:a16="http://schemas.microsoft.com/office/drawing/2014/main" xmlns="" id="{3BD20F0F-B303-4EE3-AF17-E303EA90B1A3}"/>
+                <a16:creationId xmlns:a16="http://schemas.microsoft.com/office/drawing/2014/main" id="{3BD20F0F-B303-4EE3-AF17-E303EA90B1A3}"/>
               </a:ext>
             </a:extLst>
           </p:cNvPr>
@@ -2898,7 +2894,7 @@
           <p:cNvPr id="4" name="Date Placeholder 3">
             <a:extLst>
               <a:ext uri="{FF2B5EF4-FFF2-40B4-BE49-F238E27FC236}">
-                <a16:creationId xmlns:a16="http://schemas.microsoft.com/office/drawing/2014/main" xmlns="" id="{7927ADFB-0C7F-4333-A456-815FAB4B0315}"/>
+                <a16:creationId xmlns:a16="http://schemas.microsoft.com/office/drawing/2014/main" id="{7927ADFB-0C7F-4333-A456-815FAB4B0315}"/>
               </a:ext>
             </a:extLst>
           </p:cNvPr>
@@ -2934,7 +2930,7 @@
           <a:p>
             <a:fld id="{03EC4E3E-8101-482F-A883-8B55DAFF7C07}" type="datetimeFigureOut">
               <a:rPr lang="en-SG" smtClean="0"/>
-              <a:t>30/12/2017</a:t>
+              <a:t>17/3/2018</a:t>
             </a:fld>
             <a:endParaRPr lang="en-SG"/>
           </a:p>
@@ -2945,7 +2941,7 @@
           <p:cNvPr id="5" name="Footer Placeholder 4">
             <a:extLst>
               <a:ext uri="{FF2B5EF4-FFF2-40B4-BE49-F238E27FC236}">
-                <a16:creationId xmlns:a16="http://schemas.microsoft.com/office/drawing/2014/main" xmlns="" id="{A1992B28-8397-4C93-A277-5EE43A537825}"/>
+                <a16:creationId xmlns:a16="http://schemas.microsoft.com/office/drawing/2014/main" id="{A1992B28-8397-4C93-A277-5EE43A537825}"/>
               </a:ext>
             </a:extLst>
           </p:cNvPr>
@@ -2988,7 +2984,7 @@
           <p:cNvPr id="6" name="Slide Number Placeholder 5">
             <a:extLst>
               <a:ext uri="{FF2B5EF4-FFF2-40B4-BE49-F238E27FC236}">
-                <a16:creationId xmlns:a16="http://schemas.microsoft.com/office/drawing/2014/main" xmlns="" id="{D7231209-A74B-4134-87D0-421AB81BBB47}"/>
+                <a16:creationId xmlns:a16="http://schemas.microsoft.com/office/drawing/2014/main" id="{D7231209-A74B-4134-87D0-421AB81BBB47}"/>
               </a:ext>
             </a:extLst>
           </p:cNvPr>
@@ -3535,8 +3531,8 @@
         </p:nvSpPr>
         <p:spPr>
           <a:xfrm>
-            <a:off x="2493090" y="1494315"/>
-            <a:ext cx="2621293" cy="2382474"/>
+            <a:off x="2453407" y="1494315"/>
+            <a:ext cx="2660976" cy="2382474"/>
           </a:xfrm>
           <a:custGeom>
             <a:avLst/>
@@ -3623,8 +3619,8 @@
         </p:nvSpPr>
         <p:spPr>
           <a:xfrm>
-            <a:off x="-220607" y="1494315"/>
-            <a:ext cx="2621293" cy="2382474"/>
+            <a:off x="-217871" y="1494315"/>
+            <a:ext cx="2583459" cy="2382474"/>
           </a:xfrm>
           <a:custGeom>
             <a:avLst/>
@@ -3708,7 +3704,7 @@
           <p:cNvPr id="27" name="TextBox 26">
             <a:extLst>
               <a:ext uri="{FF2B5EF4-FFF2-40B4-BE49-F238E27FC236}">
-                <a16:creationId xmlns:a16="http://schemas.microsoft.com/office/drawing/2014/main" xmlns="" id="{A602E897-AC55-414E-A133-097A608AA9CB}"/>
+                <a16:creationId xmlns:a16="http://schemas.microsoft.com/office/drawing/2014/main" id="{A602E897-AC55-414E-A133-097A608AA9CB}"/>
               </a:ext>
             </a:extLst>
           </p:cNvPr>
@@ -3749,7 +3745,7 @@
           <p:cNvPr id="28" name="TextBox 27">
             <a:extLst>
               <a:ext uri="{FF2B5EF4-FFF2-40B4-BE49-F238E27FC236}">
-                <a16:creationId xmlns:a16="http://schemas.microsoft.com/office/drawing/2014/main" xmlns="" id="{82DA2251-D0FB-46DF-9BA0-2C4F4E738263}"/>
+                <a16:creationId xmlns:a16="http://schemas.microsoft.com/office/drawing/2014/main" id="{82DA2251-D0FB-46DF-9BA0-2C4F4E738263}"/>
               </a:ext>
             </a:extLst>
           </p:cNvPr>
@@ -3790,7 +3786,7 @@
           <p:cNvPr id="29" name="Arrow: Right 28">
             <a:extLst>
               <a:ext uri="{FF2B5EF4-FFF2-40B4-BE49-F238E27FC236}">
-                <a16:creationId xmlns:a16="http://schemas.microsoft.com/office/drawing/2014/main" xmlns="" id="{A4105A79-CB0E-4CCF-8AC9-8367702C35DA}"/>
+                <a16:creationId xmlns:a16="http://schemas.microsoft.com/office/drawing/2014/main" id="{A4105A79-CB0E-4CCF-8AC9-8367702C35DA}"/>
               </a:ext>
             </a:extLst>
           </p:cNvPr>
@@ -3841,7 +3837,7 @@
           <p:cNvPr id="37" name="TextBox 36">
             <a:extLst>
               <a:ext uri="{FF2B5EF4-FFF2-40B4-BE49-F238E27FC236}">
-                <a16:creationId xmlns:a16="http://schemas.microsoft.com/office/drawing/2014/main" xmlns="" id="{8667EC55-FFE1-465D-90D3-E7951AB08C47}"/>
+                <a16:creationId xmlns:a16="http://schemas.microsoft.com/office/drawing/2014/main" id="{8667EC55-FFE1-465D-90D3-E7951AB08C47}"/>
               </a:ext>
             </a:extLst>
           </p:cNvPr>
@@ -3882,7 +3878,7 @@
           <p:cNvPr id="38" name="TextBox 37">
             <a:extLst>
               <a:ext uri="{FF2B5EF4-FFF2-40B4-BE49-F238E27FC236}">
-                <a16:creationId xmlns:a16="http://schemas.microsoft.com/office/drawing/2014/main" xmlns="" id="{E7FC04E1-E8EF-4A00-BEAB-CDBFB6DAAA8E}"/>
+                <a16:creationId xmlns:a16="http://schemas.microsoft.com/office/drawing/2014/main" id="{E7FC04E1-E8EF-4A00-BEAB-CDBFB6DAAA8E}"/>
               </a:ext>
             </a:extLst>
           </p:cNvPr>
@@ -3923,7 +3919,7 @@
           <p:cNvPr id="46" name="Table 45">
             <a:extLst>
               <a:ext uri="{FF2B5EF4-FFF2-40B4-BE49-F238E27FC236}">
-                <a16:creationId xmlns:a16="http://schemas.microsoft.com/office/drawing/2014/main" xmlns="" id="{7BA40FD4-3A8F-44EA-930E-0E72EA76EA23}"/>
+                <a16:creationId xmlns:a16="http://schemas.microsoft.com/office/drawing/2014/main" id="{7BA40FD4-3A8F-44EA-930E-0E72EA76EA23}"/>
               </a:ext>
             </a:extLst>
           </p:cNvPr>
@@ -3933,14 +3929,14 @@
           <p:nvPr>
             <p:extLst>
               <p:ext uri="{D42A27DB-BD31-4B8C-83A1-F6EECF244321}">
-                <p14:modId xmlns:p14="http://schemas.microsoft.com/office/powerpoint/2010/main" val="506067931"/>
+                <p14:modId xmlns:p14="http://schemas.microsoft.com/office/powerpoint/2010/main" val="2436763202"/>
               </p:ext>
             </p:extLst>
           </p:nvPr>
         </p:nvGraphicFramePr>
         <p:xfrm>
-          <a:off x="-147723" y="1694475"/>
-          <a:ext cx="2458129" cy="1005840"/>
+          <a:off x="-147722" y="1614576"/>
+          <a:ext cx="2421448" cy="1005840"/>
         </p:xfrm>
         <a:graphic>
           <a:graphicData uri="http://schemas.openxmlformats.org/drawingml/2006/table">
@@ -3949,10 +3945,10 @@
                 <a:tableStyleId>{638B1855-1B75-4FBE-930C-398BA8C253C6}</a:tableStyleId>
               </a:tblPr>
               <a:tblGrid>
-                <a:gridCol w="2458129">
+                <a:gridCol w="2421448">
                   <a:extLst>
                     <a:ext uri="{9D8B030D-6E8A-4147-A177-3AD203B41FA5}">
-                      <a16:colId xmlns:a16="http://schemas.microsoft.com/office/drawing/2014/main" xmlns="" val="4240773277"/>
+                      <a16:colId xmlns:a16="http://schemas.microsoft.com/office/drawing/2014/main" val="4240773277"/>
                     </a:ext>
                   </a:extLst>
                 </a:gridCol>
@@ -3990,7 +3986,7 @@
                 </a:tc>
                 <a:extLst>
                   <a:ext uri="{0D108BD9-81ED-4DB2-BD59-A6C34878D82A}">
-                    <a16:rowId xmlns:a16="http://schemas.microsoft.com/office/drawing/2014/main" xmlns="" val="2194462629"/>
+                    <a16:rowId xmlns:a16="http://schemas.microsoft.com/office/drawing/2014/main" val="2194462629"/>
                   </a:ext>
                 </a:extLst>
               </a:tr>
@@ -4012,7 +4008,7 @@
                     <a:p>
                       <a:r>
                         <a:rPr lang="en-SG" dirty="0" err="1"/>
-                        <a:t>prevAddressBook</a:t>
+                        <a:t>previousClubBook</a:t>
                       </a:r>
                       <a:r>
                         <a:rPr lang="en-SG" dirty="0"/>
@@ -4036,7 +4032,7 @@
                 </a:tc>
                 <a:extLst>
                   <a:ext uri="{0D108BD9-81ED-4DB2-BD59-A6C34878D82A}">
-                    <a16:rowId xmlns:a16="http://schemas.microsoft.com/office/drawing/2014/main" xmlns="" val="368623409"/>
+                    <a16:rowId xmlns:a16="http://schemas.microsoft.com/office/drawing/2014/main" val="368623409"/>
                   </a:ext>
                 </a:extLst>
               </a:tr>
@@ -4049,7 +4045,7 @@
           <p:cNvPr id="44" name="Table 43">
             <a:extLst>
               <a:ext uri="{FF2B5EF4-FFF2-40B4-BE49-F238E27FC236}">
-                <a16:creationId xmlns:a16="http://schemas.microsoft.com/office/drawing/2014/main" xmlns="" id="{576A6F3A-17FD-4766-8EEC-922FC2F8B776}"/>
+                <a16:creationId xmlns:a16="http://schemas.microsoft.com/office/drawing/2014/main" id="{576A6F3A-17FD-4766-8EEC-922FC2F8B776}"/>
               </a:ext>
             </a:extLst>
           </p:cNvPr>
@@ -4059,7 +4055,7 @@
           <p:nvPr>
             <p:extLst>
               <p:ext uri="{D42A27DB-BD31-4B8C-83A1-F6EECF244321}">
-                <p14:modId xmlns:p14="http://schemas.microsoft.com/office/powerpoint/2010/main" val="851524875"/>
+                <p14:modId xmlns:p14="http://schemas.microsoft.com/office/powerpoint/2010/main" val="3273700353"/>
               </p:ext>
             </p:extLst>
           </p:nvPr>
@@ -4078,7 +4074,7 @@
                 <a:gridCol w="2458129">
                   <a:extLst>
                     <a:ext uri="{9D8B030D-6E8A-4147-A177-3AD203B41FA5}">
-                      <a16:colId xmlns:a16="http://schemas.microsoft.com/office/drawing/2014/main" xmlns="" val="4240773277"/>
+                      <a16:colId xmlns:a16="http://schemas.microsoft.com/office/drawing/2014/main" val="4240773277"/>
                     </a:ext>
                   </a:extLst>
                 </a:gridCol>
@@ -4116,7 +4112,7 @@
                 </a:tc>
                 <a:extLst>
                   <a:ext uri="{0D108BD9-81ED-4DB2-BD59-A6C34878D82A}">
-                    <a16:rowId xmlns:a16="http://schemas.microsoft.com/office/drawing/2014/main" xmlns="" val="2194462629"/>
+                    <a16:rowId xmlns:a16="http://schemas.microsoft.com/office/drawing/2014/main" val="2194462629"/>
                   </a:ext>
                 </a:extLst>
               </a:tr>
@@ -4138,7 +4134,7 @@
                     <a:p>
                       <a:r>
                         <a:rPr lang="en-SG" dirty="0" err="1"/>
-                        <a:t>prevAddressBook</a:t>
+                        <a:t>previousClubBook</a:t>
                       </a:r>
                       <a:r>
                         <a:rPr lang="en-SG" dirty="0"/>
@@ -4162,7 +4158,7 @@
                 </a:tc>
                 <a:extLst>
                   <a:ext uri="{0D108BD9-81ED-4DB2-BD59-A6C34878D82A}">
-                    <a16:rowId xmlns:a16="http://schemas.microsoft.com/office/drawing/2014/main" xmlns="" val="368623409"/>
+                    <a16:rowId xmlns:a16="http://schemas.microsoft.com/office/drawing/2014/main" val="368623409"/>
                   </a:ext>
                 </a:extLst>
               </a:tr>
@@ -4175,7 +4171,7 @@
           <p:cNvPr id="43" name="Table 42">
             <a:extLst>
               <a:ext uri="{FF2B5EF4-FFF2-40B4-BE49-F238E27FC236}">
-                <a16:creationId xmlns:a16="http://schemas.microsoft.com/office/drawing/2014/main" xmlns="" id="{E38B6292-CE11-44D1-BDA4-34DF2961750B}"/>
+                <a16:creationId xmlns:a16="http://schemas.microsoft.com/office/drawing/2014/main" id="{E38B6292-CE11-44D1-BDA4-34DF2961750B}"/>
               </a:ext>
             </a:extLst>
           </p:cNvPr>
@@ -4185,14 +4181,14 @@
           <p:nvPr>
             <p:extLst>
               <p:ext uri="{D42A27DB-BD31-4B8C-83A1-F6EECF244321}">
-                <p14:modId xmlns:p14="http://schemas.microsoft.com/office/powerpoint/2010/main" val="1269597399"/>
+                <p14:modId xmlns:p14="http://schemas.microsoft.com/office/powerpoint/2010/main" val="3888716947"/>
               </p:ext>
             </p:extLst>
           </p:nvPr>
         </p:nvGraphicFramePr>
         <p:xfrm>
-          <a:off x="-147724" y="2779309"/>
-          <a:ext cx="2458129" cy="1005840"/>
+          <a:off x="-147723" y="2708287"/>
+          <a:ext cx="2421448" cy="1005840"/>
         </p:xfrm>
         <a:graphic>
           <a:graphicData uri="http://schemas.openxmlformats.org/drawingml/2006/table">
@@ -4201,10 +4197,10 @@
                 <a:tableStyleId>{638B1855-1B75-4FBE-930C-398BA8C253C6}</a:tableStyleId>
               </a:tblPr>
               <a:tblGrid>
-                <a:gridCol w="2458129">
+                <a:gridCol w="2421448">
                   <a:extLst>
                     <a:ext uri="{9D8B030D-6E8A-4147-A177-3AD203B41FA5}">
-                      <a16:colId xmlns:a16="http://schemas.microsoft.com/office/drawing/2014/main" xmlns="" val="4240773277"/>
+                      <a16:colId xmlns:a16="http://schemas.microsoft.com/office/drawing/2014/main" val="4240773277"/>
                     </a:ext>
                   </a:extLst>
                 </a:gridCol>
@@ -4242,7 +4238,7 @@
                 </a:tc>
                 <a:extLst>
                   <a:ext uri="{0D108BD9-81ED-4DB2-BD59-A6C34878D82A}">
-                    <a16:rowId xmlns:a16="http://schemas.microsoft.com/office/drawing/2014/main" xmlns="" val="2194462629"/>
+                    <a16:rowId xmlns:a16="http://schemas.microsoft.com/office/drawing/2014/main" val="2194462629"/>
                   </a:ext>
                 </a:extLst>
               </a:tr>
@@ -4264,7 +4260,7 @@
                     <a:p>
                       <a:r>
                         <a:rPr lang="en-SG" dirty="0" err="1"/>
-                        <a:t>prevAddressBook</a:t>
+                        <a:t>previousClubBook</a:t>
                       </a:r>
                       <a:r>
                         <a:rPr lang="en-SG" dirty="0"/>
@@ -4288,7 +4284,7 @@
                 </a:tc>
                 <a:extLst>
                   <a:ext uri="{0D108BD9-81ED-4DB2-BD59-A6C34878D82A}">
-                    <a16:rowId xmlns:a16="http://schemas.microsoft.com/office/drawing/2014/main" xmlns="" val="368623409"/>
+                    <a16:rowId xmlns:a16="http://schemas.microsoft.com/office/drawing/2014/main" val="368623409"/>
                   </a:ext>
                 </a:extLst>
               </a:tr>
@@ -4301,7 +4297,7 @@
           <p:cNvPr id="45" name="Table 44">
             <a:extLst>
               <a:ext uri="{FF2B5EF4-FFF2-40B4-BE49-F238E27FC236}">
-                <a16:creationId xmlns:a16="http://schemas.microsoft.com/office/drawing/2014/main" xmlns="" id="{AF868A4F-9EFF-430E-BB35-5EE7938A56BB}"/>
+                <a16:creationId xmlns:a16="http://schemas.microsoft.com/office/drawing/2014/main" id="{AF868A4F-9EFF-430E-BB35-5EE7938A56BB}"/>
               </a:ext>
             </a:extLst>
           </p:cNvPr>
@@ -4311,7 +4307,7 @@
           <p:nvPr>
             <p:extLst>
               <p:ext uri="{D42A27DB-BD31-4B8C-83A1-F6EECF244321}">
-                <p14:modId xmlns:p14="http://schemas.microsoft.com/office/powerpoint/2010/main" val="1234221273"/>
+                <p14:modId xmlns:p14="http://schemas.microsoft.com/office/powerpoint/2010/main" val="3052277223"/>
               </p:ext>
             </p:extLst>
           </p:nvPr>
@@ -4330,7 +4326,7 @@
                 <a:gridCol w="2378350">
                   <a:extLst>
                     <a:ext uri="{9D8B030D-6E8A-4147-A177-3AD203B41FA5}">
-                      <a16:colId xmlns:a16="http://schemas.microsoft.com/office/drawing/2014/main" xmlns="" val="4240773277"/>
+                      <a16:colId xmlns:a16="http://schemas.microsoft.com/office/drawing/2014/main" val="4240773277"/>
                     </a:ext>
                   </a:extLst>
                 </a:gridCol>
@@ -4368,7 +4364,7 @@
                 </a:tc>
                 <a:extLst>
                   <a:ext uri="{0D108BD9-81ED-4DB2-BD59-A6C34878D82A}">
-                    <a16:rowId xmlns:a16="http://schemas.microsoft.com/office/drawing/2014/main" xmlns="" val="2194462629"/>
+                    <a16:rowId xmlns:a16="http://schemas.microsoft.com/office/drawing/2014/main" val="2194462629"/>
                   </a:ext>
                 </a:extLst>
               </a:tr>
@@ -4390,7 +4386,7 @@
                     <a:p>
                       <a:r>
                         <a:rPr lang="en-SG" dirty="0" err="1"/>
-                        <a:t>prevAddressBook</a:t>
+                        <a:t>previousClubBook</a:t>
                       </a:r>
                       <a:r>
                         <a:rPr lang="en-SG" dirty="0"/>
@@ -4414,7 +4410,7 @@
                 </a:tc>
                 <a:extLst>
                   <a:ext uri="{0D108BD9-81ED-4DB2-BD59-A6C34878D82A}">
-                    <a16:rowId xmlns:a16="http://schemas.microsoft.com/office/drawing/2014/main" xmlns="" val="368623409"/>
+                    <a16:rowId xmlns:a16="http://schemas.microsoft.com/office/drawing/2014/main" val="368623409"/>
                   </a:ext>
                 </a:extLst>
               </a:tr>
@@ -4427,7 +4423,7 @@
           <p:cNvPr id="2" name="TextBox 1">
             <a:extLst>
               <a:ext uri="{FF2B5EF4-FFF2-40B4-BE49-F238E27FC236}">
-                <a16:creationId xmlns:a16="http://schemas.microsoft.com/office/drawing/2014/main" xmlns="" id="{032C4FEA-C10B-4133-9BF6-AF6F40CC1AD4}"/>
+                <a16:creationId xmlns:a16="http://schemas.microsoft.com/office/drawing/2014/main" id="{032C4FEA-C10B-4133-9BF6-AF6F40CC1AD4}"/>
               </a:ext>
             </a:extLst>
           </p:cNvPr>

</xml_diff>

<commit_message>
Edit diagram in DeveloperGuide
</commit_message>
<xml_diff>
--- a/docs/diagrams/UndoRedoExecuteUndoStackDiagram.pptx
+++ b/docs/diagrams/UndoRedoExecuteUndoStackDiagram.pptx
@@ -261,7 +261,7 @@
           <a:p>
             <a:fld id="{03EC4E3E-8101-482F-A883-8B55DAFF7C07}" type="datetimeFigureOut">
               <a:rPr lang="en-SG" smtClean="0"/>
-              <a:t>17/3/2018</a:t>
+              <a:t>19/3/2018</a:t>
             </a:fld>
             <a:endParaRPr lang="en-SG"/>
           </a:p>
@@ -461,7 +461,7 @@
           <a:p>
             <a:fld id="{03EC4E3E-8101-482F-A883-8B55DAFF7C07}" type="datetimeFigureOut">
               <a:rPr lang="en-SG" smtClean="0"/>
-              <a:t>17/3/2018</a:t>
+              <a:t>19/3/2018</a:t>
             </a:fld>
             <a:endParaRPr lang="en-SG"/>
           </a:p>
@@ -671,7 +671,7 @@
           <a:p>
             <a:fld id="{03EC4E3E-8101-482F-A883-8B55DAFF7C07}" type="datetimeFigureOut">
               <a:rPr lang="en-SG" smtClean="0"/>
-              <a:t>17/3/2018</a:t>
+              <a:t>19/3/2018</a:t>
             </a:fld>
             <a:endParaRPr lang="en-SG"/>
           </a:p>
@@ -871,7 +871,7 @@
           <a:p>
             <a:fld id="{03EC4E3E-8101-482F-A883-8B55DAFF7C07}" type="datetimeFigureOut">
               <a:rPr lang="en-SG" smtClean="0"/>
-              <a:t>17/3/2018</a:t>
+              <a:t>19/3/2018</a:t>
             </a:fld>
             <a:endParaRPr lang="en-SG"/>
           </a:p>
@@ -1147,7 +1147,7 @@
           <a:p>
             <a:fld id="{03EC4E3E-8101-482F-A883-8B55DAFF7C07}" type="datetimeFigureOut">
               <a:rPr lang="en-SG" smtClean="0"/>
-              <a:t>17/3/2018</a:t>
+              <a:t>19/3/2018</a:t>
             </a:fld>
             <a:endParaRPr lang="en-SG"/>
           </a:p>
@@ -1415,7 +1415,7 @@
           <a:p>
             <a:fld id="{03EC4E3E-8101-482F-A883-8B55DAFF7C07}" type="datetimeFigureOut">
               <a:rPr lang="en-SG" smtClean="0"/>
-              <a:t>17/3/2018</a:t>
+              <a:t>19/3/2018</a:t>
             </a:fld>
             <a:endParaRPr lang="en-SG"/>
           </a:p>
@@ -1830,7 +1830,7 @@
           <a:p>
             <a:fld id="{03EC4E3E-8101-482F-A883-8B55DAFF7C07}" type="datetimeFigureOut">
               <a:rPr lang="en-SG" smtClean="0"/>
-              <a:t>17/3/2018</a:t>
+              <a:t>19/3/2018</a:t>
             </a:fld>
             <a:endParaRPr lang="en-SG"/>
           </a:p>
@@ -1972,7 +1972,7 @@
           <a:p>
             <a:fld id="{03EC4E3E-8101-482F-A883-8B55DAFF7C07}" type="datetimeFigureOut">
               <a:rPr lang="en-SG" smtClean="0"/>
-              <a:t>17/3/2018</a:t>
+              <a:t>19/3/2018</a:t>
             </a:fld>
             <a:endParaRPr lang="en-SG"/>
           </a:p>
@@ -2085,7 +2085,7 @@
           <a:p>
             <a:fld id="{03EC4E3E-8101-482F-A883-8B55DAFF7C07}" type="datetimeFigureOut">
               <a:rPr lang="en-SG" smtClean="0"/>
-              <a:t>17/3/2018</a:t>
+              <a:t>19/3/2018</a:t>
             </a:fld>
             <a:endParaRPr lang="en-SG"/>
           </a:p>
@@ -2398,7 +2398,7 @@
           <a:p>
             <a:fld id="{03EC4E3E-8101-482F-A883-8B55DAFF7C07}" type="datetimeFigureOut">
               <a:rPr lang="en-SG" smtClean="0"/>
-              <a:t>17/3/2018</a:t>
+              <a:t>19/3/2018</a:t>
             </a:fld>
             <a:endParaRPr lang="en-SG"/>
           </a:p>
@@ -2687,7 +2687,7 @@
           <a:p>
             <a:fld id="{03EC4E3E-8101-482F-A883-8B55DAFF7C07}" type="datetimeFigureOut">
               <a:rPr lang="en-SG" smtClean="0"/>
-              <a:t>17/3/2018</a:t>
+              <a:t>19/3/2018</a:t>
             </a:fld>
             <a:endParaRPr lang="en-SG"/>
           </a:p>
@@ -2930,7 +2930,7 @@
           <a:p>
             <a:fld id="{03EC4E3E-8101-482F-A883-8B55DAFF7C07}" type="datetimeFigureOut">
               <a:rPr lang="en-SG" smtClean="0"/>
-              <a:t>17/3/2018</a:t>
+              <a:t>19/3/2018</a:t>
             </a:fld>
             <a:endParaRPr lang="en-SG"/>
           </a:p>
@@ -4474,7 +4474,15 @@
             <a:pPr algn="ctr"/>
             <a:r>
               <a:rPr lang="en-SG" dirty="0"/>
-              <a:t>The state of the address book (before ‘add n/David’ was executed) will be restored to s2.</a:t>
+              <a:t>The state of </a:t>
+            </a:r>
+            <a:r>
+              <a:rPr lang="en-SG"/>
+              <a:t>the Club </a:t>
+            </a:r>
+            <a:r>
+              <a:rPr lang="en-SG" dirty="0"/>
+              <a:t>book (before ‘add n/David’ was executed) will be restored to s2.</a:t>
             </a:r>
           </a:p>
         </p:txBody>

</xml_diff>